<commit_message>
Triggers notes and End2End demo
</commit_message>
<xml_diff>
--- a/Triggers/Triggers - inserted and deleted tables.pptx
+++ b/Triggers/Triggers - inserted and deleted tables.pptx
@@ -104,6 +104,22 @@
       </a:defRPr>
     </a:lvl9pPr>
   </p:defaultTextStyle>
+  <p:extLst>
+    <p:ext uri="{EFAFB233-063F-42B5-8137-9DF3F51BA10A}">
+      <p15:sldGuideLst xmlns:p15="http://schemas.microsoft.com/office/powerpoint/2012/main">
+        <p15:guide id="1" orient="horz" pos="2160">
+          <p15:clr>
+            <a:srgbClr val="A4A3A4"/>
+          </p15:clr>
+        </p15:guide>
+        <p15:guide id="2" pos="2880">
+          <p15:clr>
+            <a:srgbClr val="A4A3A4"/>
+          </p15:clr>
+        </p15:guide>
+      </p15:sldGuideLst>
+    </p:ext>
+  </p:extLst>
 </p:presentation>
 </file>
 
@@ -145,7 +161,7 @@
           <a:lstStyle/>
           <a:p>
             <a:r>
-              <a:rPr lang="en-US" smtClean="0"/>
+              <a:rPr lang="en-US"/>
               <a:t>Click to edit Master title style</a:t>
             </a:r>
             <a:endParaRPr lang="en-CA"/>
@@ -264,7 +280,7 @@
           </a:lstStyle>
           <a:p>
             <a:r>
-              <a:rPr lang="en-US" smtClean="0"/>
+              <a:rPr lang="en-US"/>
               <a:t>Click to edit Master subtitle style</a:t>
             </a:r>
             <a:endParaRPr lang="en-CA"/>
@@ -288,7 +304,7 @@
           <a:p>
             <a:fld id="{8CDD2D44-4ED8-47D5-8714-65D4F6D3A3A6}" type="datetimeFigureOut">
               <a:rPr lang="en-CA" smtClean="0"/>
-              <a:t>04/12/2012</a:t>
+              <a:t>2020-11-29</a:t>
             </a:fld>
             <a:endParaRPr lang="en-CA"/>
           </a:p>
@@ -382,7 +398,7 @@
           <a:lstStyle/>
           <a:p>
             <a:r>
-              <a:rPr lang="en-US" smtClean="0"/>
+              <a:rPr lang="en-US"/>
               <a:t>Click to edit Master title style</a:t>
             </a:r>
             <a:endParaRPr lang="en-CA"/>
@@ -406,35 +422,35 @@
           <a:p>
             <a:pPr lvl="0"/>
             <a:r>
-              <a:rPr lang="en-US" smtClean="0"/>
+              <a:rPr lang="en-US"/>
               <a:t>Click to edit Master text styles</a:t>
             </a:r>
           </a:p>
           <a:p>
             <a:pPr lvl="1"/>
             <a:r>
-              <a:rPr lang="en-US" smtClean="0"/>
+              <a:rPr lang="en-US"/>
               <a:t>Second level</a:t>
             </a:r>
           </a:p>
           <a:p>
             <a:pPr lvl="2"/>
             <a:r>
-              <a:rPr lang="en-US" smtClean="0"/>
+              <a:rPr lang="en-US"/>
               <a:t>Third level</a:t>
             </a:r>
           </a:p>
           <a:p>
             <a:pPr lvl="3"/>
             <a:r>
-              <a:rPr lang="en-US" smtClean="0"/>
+              <a:rPr lang="en-US"/>
               <a:t>Fourth level</a:t>
             </a:r>
           </a:p>
           <a:p>
             <a:pPr lvl="4"/>
             <a:r>
-              <a:rPr lang="en-US" smtClean="0"/>
+              <a:rPr lang="en-US"/>
               <a:t>Fifth level</a:t>
             </a:r>
             <a:endParaRPr lang="en-CA"/>
@@ -458,7 +474,7 @@
           <a:p>
             <a:fld id="{8CDD2D44-4ED8-47D5-8714-65D4F6D3A3A6}" type="datetimeFigureOut">
               <a:rPr lang="en-CA" smtClean="0"/>
-              <a:t>04/12/2012</a:t>
+              <a:t>2020-11-29</a:t>
             </a:fld>
             <a:endParaRPr lang="en-CA"/>
           </a:p>
@@ -557,7 +573,7 @@
           <a:lstStyle/>
           <a:p>
             <a:r>
-              <a:rPr lang="en-US" smtClean="0"/>
+              <a:rPr lang="en-US"/>
               <a:t>Click to edit Master title style</a:t>
             </a:r>
             <a:endParaRPr lang="en-CA"/>
@@ -586,35 +602,35 @@
           <a:p>
             <a:pPr lvl="0"/>
             <a:r>
-              <a:rPr lang="en-US" smtClean="0"/>
+              <a:rPr lang="en-US"/>
               <a:t>Click to edit Master text styles</a:t>
             </a:r>
           </a:p>
           <a:p>
             <a:pPr lvl="1"/>
             <a:r>
-              <a:rPr lang="en-US" smtClean="0"/>
+              <a:rPr lang="en-US"/>
               <a:t>Second level</a:t>
             </a:r>
           </a:p>
           <a:p>
             <a:pPr lvl="2"/>
             <a:r>
-              <a:rPr lang="en-US" smtClean="0"/>
+              <a:rPr lang="en-US"/>
               <a:t>Third level</a:t>
             </a:r>
           </a:p>
           <a:p>
             <a:pPr lvl="3"/>
             <a:r>
-              <a:rPr lang="en-US" smtClean="0"/>
+              <a:rPr lang="en-US"/>
               <a:t>Fourth level</a:t>
             </a:r>
           </a:p>
           <a:p>
             <a:pPr lvl="4"/>
             <a:r>
-              <a:rPr lang="en-US" smtClean="0"/>
+              <a:rPr lang="en-US"/>
               <a:t>Fifth level</a:t>
             </a:r>
             <a:endParaRPr lang="en-CA"/>
@@ -638,7 +654,7 @@
           <a:p>
             <a:fld id="{8CDD2D44-4ED8-47D5-8714-65D4F6D3A3A6}" type="datetimeFigureOut">
               <a:rPr lang="en-CA" smtClean="0"/>
-              <a:t>04/12/2012</a:t>
+              <a:t>2020-11-29</a:t>
             </a:fld>
             <a:endParaRPr lang="en-CA"/>
           </a:p>
@@ -732,7 +748,7 @@
           <a:lstStyle/>
           <a:p>
             <a:r>
-              <a:rPr lang="en-US" smtClean="0"/>
+              <a:rPr lang="en-US"/>
               <a:t>Click to edit Master title style</a:t>
             </a:r>
             <a:endParaRPr lang="en-CA"/>
@@ -756,35 +772,35 @@
           <a:p>
             <a:pPr lvl="0"/>
             <a:r>
-              <a:rPr lang="en-US" smtClean="0"/>
+              <a:rPr lang="en-US"/>
               <a:t>Click to edit Master text styles</a:t>
             </a:r>
           </a:p>
           <a:p>
             <a:pPr lvl="1"/>
             <a:r>
-              <a:rPr lang="en-US" smtClean="0"/>
+              <a:rPr lang="en-US"/>
               <a:t>Second level</a:t>
             </a:r>
           </a:p>
           <a:p>
             <a:pPr lvl="2"/>
             <a:r>
-              <a:rPr lang="en-US" smtClean="0"/>
+              <a:rPr lang="en-US"/>
               <a:t>Third level</a:t>
             </a:r>
           </a:p>
           <a:p>
             <a:pPr lvl="3"/>
             <a:r>
-              <a:rPr lang="en-US" smtClean="0"/>
+              <a:rPr lang="en-US"/>
               <a:t>Fourth level</a:t>
             </a:r>
           </a:p>
           <a:p>
             <a:pPr lvl="4"/>
             <a:r>
-              <a:rPr lang="en-US" smtClean="0"/>
+              <a:rPr lang="en-US"/>
               <a:t>Fifth level</a:t>
             </a:r>
             <a:endParaRPr lang="en-CA"/>
@@ -808,7 +824,7 @@
           <a:p>
             <a:fld id="{8CDD2D44-4ED8-47D5-8714-65D4F6D3A3A6}" type="datetimeFigureOut">
               <a:rPr lang="en-CA" smtClean="0"/>
-              <a:t>04/12/2012</a:t>
+              <a:t>2020-11-29</a:t>
             </a:fld>
             <a:endParaRPr lang="en-CA"/>
           </a:p>
@@ -911,7 +927,7 @@
           </a:lstStyle>
           <a:p>
             <a:r>
-              <a:rPr lang="en-US" smtClean="0"/>
+              <a:rPr lang="en-US"/>
               <a:t>Click to edit Master title style</a:t>
             </a:r>
             <a:endParaRPr lang="en-CA"/>
@@ -1031,7 +1047,7 @@
           <a:p>
             <a:pPr lvl="0"/>
             <a:r>
-              <a:rPr lang="en-US" smtClean="0"/>
+              <a:rPr lang="en-US"/>
               <a:t>Click to edit Master text styles</a:t>
             </a:r>
           </a:p>
@@ -1054,7 +1070,7 @@
           <a:p>
             <a:fld id="{8CDD2D44-4ED8-47D5-8714-65D4F6D3A3A6}" type="datetimeFigureOut">
               <a:rPr lang="en-CA" smtClean="0"/>
-              <a:t>04/12/2012</a:t>
+              <a:t>2020-11-29</a:t>
             </a:fld>
             <a:endParaRPr lang="en-CA"/>
           </a:p>
@@ -1148,7 +1164,7 @@
           <a:lstStyle/>
           <a:p>
             <a:r>
-              <a:rPr lang="en-US" smtClean="0"/>
+              <a:rPr lang="en-US"/>
               <a:t>Click to edit Master title style</a:t>
             </a:r>
             <a:endParaRPr lang="en-CA"/>
@@ -1205,35 +1221,35 @@
           <a:p>
             <a:pPr lvl="0"/>
             <a:r>
-              <a:rPr lang="en-US" smtClean="0"/>
+              <a:rPr lang="en-US"/>
               <a:t>Click to edit Master text styles</a:t>
             </a:r>
           </a:p>
           <a:p>
             <a:pPr lvl="1"/>
             <a:r>
-              <a:rPr lang="en-US" smtClean="0"/>
+              <a:rPr lang="en-US"/>
               <a:t>Second level</a:t>
             </a:r>
           </a:p>
           <a:p>
             <a:pPr lvl="2"/>
             <a:r>
-              <a:rPr lang="en-US" smtClean="0"/>
+              <a:rPr lang="en-US"/>
               <a:t>Third level</a:t>
             </a:r>
           </a:p>
           <a:p>
             <a:pPr lvl="3"/>
             <a:r>
-              <a:rPr lang="en-US" smtClean="0"/>
+              <a:rPr lang="en-US"/>
               <a:t>Fourth level</a:t>
             </a:r>
           </a:p>
           <a:p>
             <a:pPr lvl="4"/>
             <a:r>
-              <a:rPr lang="en-US" smtClean="0"/>
+              <a:rPr lang="en-US"/>
               <a:t>Fifth level</a:t>
             </a:r>
             <a:endParaRPr lang="en-CA"/>
@@ -1290,35 +1306,35 @@
           <a:p>
             <a:pPr lvl="0"/>
             <a:r>
-              <a:rPr lang="en-US" smtClean="0"/>
+              <a:rPr lang="en-US"/>
               <a:t>Click to edit Master text styles</a:t>
             </a:r>
           </a:p>
           <a:p>
             <a:pPr lvl="1"/>
             <a:r>
-              <a:rPr lang="en-US" smtClean="0"/>
+              <a:rPr lang="en-US"/>
               <a:t>Second level</a:t>
             </a:r>
           </a:p>
           <a:p>
             <a:pPr lvl="2"/>
             <a:r>
-              <a:rPr lang="en-US" smtClean="0"/>
+              <a:rPr lang="en-US"/>
               <a:t>Third level</a:t>
             </a:r>
           </a:p>
           <a:p>
             <a:pPr lvl="3"/>
             <a:r>
-              <a:rPr lang="en-US" smtClean="0"/>
+              <a:rPr lang="en-US"/>
               <a:t>Fourth level</a:t>
             </a:r>
           </a:p>
           <a:p>
             <a:pPr lvl="4"/>
             <a:r>
-              <a:rPr lang="en-US" smtClean="0"/>
+              <a:rPr lang="en-US"/>
               <a:t>Fifth level</a:t>
             </a:r>
             <a:endParaRPr lang="en-CA"/>
@@ -1342,7 +1358,7 @@
           <a:p>
             <a:fld id="{8CDD2D44-4ED8-47D5-8714-65D4F6D3A3A6}" type="datetimeFigureOut">
               <a:rPr lang="en-CA" smtClean="0"/>
-              <a:t>04/12/2012</a:t>
+              <a:t>2020-11-29</a:t>
             </a:fld>
             <a:endParaRPr lang="en-CA"/>
           </a:p>
@@ -1440,7 +1456,7 @@
           </a:lstStyle>
           <a:p>
             <a:r>
-              <a:rPr lang="en-US" smtClean="0"/>
+              <a:rPr lang="en-US"/>
               <a:t>Click to edit Master title style</a:t>
             </a:r>
             <a:endParaRPr lang="en-CA"/>
@@ -1506,7 +1522,7 @@
           <a:p>
             <a:pPr lvl="0"/>
             <a:r>
-              <a:rPr lang="en-US" smtClean="0"/>
+              <a:rPr lang="en-US"/>
               <a:t>Click to edit Master text styles</a:t>
             </a:r>
           </a:p>
@@ -1562,35 +1578,35 @@
           <a:p>
             <a:pPr lvl="0"/>
             <a:r>
-              <a:rPr lang="en-US" smtClean="0"/>
+              <a:rPr lang="en-US"/>
               <a:t>Click to edit Master text styles</a:t>
             </a:r>
           </a:p>
           <a:p>
             <a:pPr lvl="1"/>
             <a:r>
-              <a:rPr lang="en-US" smtClean="0"/>
+              <a:rPr lang="en-US"/>
               <a:t>Second level</a:t>
             </a:r>
           </a:p>
           <a:p>
             <a:pPr lvl="2"/>
             <a:r>
-              <a:rPr lang="en-US" smtClean="0"/>
+              <a:rPr lang="en-US"/>
               <a:t>Third level</a:t>
             </a:r>
           </a:p>
           <a:p>
             <a:pPr lvl="3"/>
             <a:r>
-              <a:rPr lang="en-US" smtClean="0"/>
+              <a:rPr lang="en-US"/>
               <a:t>Fourth level</a:t>
             </a:r>
           </a:p>
           <a:p>
             <a:pPr lvl="4"/>
             <a:r>
-              <a:rPr lang="en-US" smtClean="0"/>
+              <a:rPr lang="en-US"/>
               <a:t>Fifth level</a:t>
             </a:r>
             <a:endParaRPr lang="en-CA"/>
@@ -1656,7 +1672,7 @@
           <a:p>
             <a:pPr lvl="0"/>
             <a:r>
-              <a:rPr lang="en-US" smtClean="0"/>
+              <a:rPr lang="en-US"/>
               <a:t>Click to edit Master text styles</a:t>
             </a:r>
           </a:p>
@@ -1712,35 +1728,35 @@
           <a:p>
             <a:pPr lvl="0"/>
             <a:r>
-              <a:rPr lang="en-US" smtClean="0"/>
+              <a:rPr lang="en-US"/>
               <a:t>Click to edit Master text styles</a:t>
             </a:r>
           </a:p>
           <a:p>
             <a:pPr lvl="1"/>
             <a:r>
-              <a:rPr lang="en-US" smtClean="0"/>
+              <a:rPr lang="en-US"/>
               <a:t>Second level</a:t>
             </a:r>
           </a:p>
           <a:p>
             <a:pPr lvl="2"/>
             <a:r>
-              <a:rPr lang="en-US" smtClean="0"/>
+              <a:rPr lang="en-US"/>
               <a:t>Third level</a:t>
             </a:r>
           </a:p>
           <a:p>
             <a:pPr lvl="3"/>
             <a:r>
-              <a:rPr lang="en-US" smtClean="0"/>
+              <a:rPr lang="en-US"/>
               <a:t>Fourth level</a:t>
             </a:r>
           </a:p>
           <a:p>
             <a:pPr lvl="4"/>
             <a:r>
-              <a:rPr lang="en-US" smtClean="0"/>
+              <a:rPr lang="en-US"/>
               <a:t>Fifth level</a:t>
             </a:r>
             <a:endParaRPr lang="en-CA"/>
@@ -1764,7 +1780,7 @@
           <a:p>
             <a:fld id="{8CDD2D44-4ED8-47D5-8714-65D4F6D3A3A6}" type="datetimeFigureOut">
               <a:rPr lang="en-CA" smtClean="0"/>
-              <a:t>04/12/2012</a:t>
+              <a:t>2020-11-29</a:t>
             </a:fld>
             <a:endParaRPr lang="en-CA"/>
           </a:p>
@@ -1858,7 +1874,7 @@
           <a:lstStyle/>
           <a:p>
             <a:r>
-              <a:rPr lang="en-US" smtClean="0"/>
+              <a:rPr lang="en-US"/>
               <a:t>Click to edit Master title style</a:t>
             </a:r>
             <a:endParaRPr lang="en-CA"/>
@@ -1882,7 +1898,7 @@
           <a:p>
             <a:fld id="{8CDD2D44-4ED8-47D5-8714-65D4F6D3A3A6}" type="datetimeFigureOut">
               <a:rPr lang="en-CA" smtClean="0"/>
-              <a:t>04/12/2012</a:t>
+              <a:t>2020-11-29</a:t>
             </a:fld>
             <a:endParaRPr lang="en-CA"/>
           </a:p>
@@ -1977,7 +1993,7 @@
           <a:p>
             <a:fld id="{8CDD2D44-4ED8-47D5-8714-65D4F6D3A3A6}" type="datetimeFigureOut">
               <a:rPr lang="en-CA" smtClean="0"/>
-              <a:t>04/12/2012</a:t>
+              <a:t>2020-11-29</a:t>
             </a:fld>
             <a:endParaRPr lang="en-CA"/>
           </a:p>
@@ -2080,7 +2096,7 @@
           </a:lstStyle>
           <a:p>
             <a:r>
-              <a:rPr lang="en-US" smtClean="0"/>
+              <a:rPr lang="en-US"/>
               <a:t>Click to edit Master title style</a:t>
             </a:r>
             <a:endParaRPr lang="en-CA"/>
@@ -2137,35 +2153,35 @@
           <a:p>
             <a:pPr lvl="0"/>
             <a:r>
-              <a:rPr lang="en-US" smtClean="0"/>
+              <a:rPr lang="en-US"/>
               <a:t>Click to edit Master text styles</a:t>
             </a:r>
           </a:p>
           <a:p>
             <a:pPr lvl="1"/>
             <a:r>
-              <a:rPr lang="en-US" smtClean="0"/>
+              <a:rPr lang="en-US"/>
               <a:t>Second level</a:t>
             </a:r>
           </a:p>
           <a:p>
             <a:pPr lvl="2"/>
             <a:r>
-              <a:rPr lang="en-US" smtClean="0"/>
+              <a:rPr lang="en-US"/>
               <a:t>Third level</a:t>
             </a:r>
           </a:p>
           <a:p>
             <a:pPr lvl="3"/>
             <a:r>
-              <a:rPr lang="en-US" smtClean="0"/>
+              <a:rPr lang="en-US"/>
               <a:t>Fourth level</a:t>
             </a:r>
           </a:p>
           <a:p>
             <a:pPr lvl="4"/>
             <a:r>
-              <a:rPr lang="en-US" smtClean="0"/>
+              <a:rPr lang="en-US"/>
               <a:t>Fifth level</a:t>
             </a:r>
             <a:endParaRPr lang="en-CA"/>
@@ -2231,7 +2247,7 @@
           <a:p>
             <a:pPr lvl="0"/>
             <a:r>
-              <a:rPr lang="en-US" smtClean="0"/>
+              <a:rPr lang="en-US"/>
               <a:t>Click to edit Master text styles</a:t>
             </a:r>
           </a:p>
@@ -2254,7 +2270,7 @@
           <a:p>
             <a:fld id="{8CDD2D44-4ED8-47D5-8714-65D4F6D3A3A6}" type="datetimeFigureOut">
               <a:rPr lang="en-CA" smtClean="0"/>
-              <a:t>04/12/2012</a:t>
+              <a:t>2020-11-29</a:t>
             </a:fld>
             <a:endParaRPr lang="en-CA"/>
           </a:p>
@@ -2357,7 +2373,7 @@
           </a:lstStyle>
           <a:p>
             <a:r>
-              <a:rPr lang="en-US" smtClean="0"/>
+              <a:rPr lang="en-US"/>
               <a:t>Click to edit Master title style</a:t>
             </a:r>
             <a:endParaRPr lang="en-CA"/>
@@ -2484,7 +2500,7 @@
           <a:p>
             <a:pPr lvl="0"/>
             <a:r>
-              <a:rPr lang="en-US" smtClean="0"/>
+              <a:rPr lang="en-US"/>
               <a:t>Click to edit Master text styles</a:t>
             </a:r>
           </a:p>
@@ -2507,7 +2523,7 @@
           <a:p>
             <a:fld id="{8CDD2D44-4ED8-47D5-8714-65D4F6D3A3A6}" type="datetimeFigureOut">
               <a:rPr lang="en-CA" smtClean="0"/>
-              <a:t>04/12/2012</a:t>
+              <a:t>2020-11-29</a:t>
             </a:fld>
             <a:endParaRPr lang="en-CA"/>
           </a:p>
@@ -2616,7 +2632,7 @@
           <a:lstStyle/>
           <a:p>
             <a:r>
-              <a:rPr lang="en-US" smtClean="0"/>
+              <a:rPr lang="en-US"/>
               <a:t>Click to edit Master title style</a:t>
             </a:r>
             <a:endParaRPr lang="en-CA"/>
@@ -2650,35 +2666,35 @@
           <a:p>
             <a:pPr lvl="0"/>
             <a:r>
-              <a:rPr lang="en-US" smtClean="0"/>
+              <a:rPr lang="en-US"/>
               <a:t>Click to edit Master text styles</a:t>
             </a:r>
           </a:p>
           <a:p>
             <a:pPr lvl="1"/>
             <a:r>
-              <a:rPr lang="en-US" smtClean="0"/>
+              <a:rPr lang="en-US"/>
               <a:t>Second level</a:t>
             </a:r>
           </a:p>
           <a:p>
             <a:pPr lvl="2"/>
             <a:r>
-              <a:rPr lang="en-US" smtClean="0"/>
+              <a:rPr lang="en-US"/>
               <a:t>Third level</a:t>
             </a:r>
           </a:p>
           <a:p>
             <a:pPr lvl="3"/>
             <a:r>
-              <a:rPr lang="en-US" smtClean="0"/>
+              <a:rPr lang="en-US"/>
               <a:t>Fourth level</a:t>
             </a:r>
           </a:p>
           <a:p>
             <a:pPr lvl="4"/>
             <a:r>
-              <a:rPr lang="en-US" smtClean="0"/>
+              <a:rPr lang="en-US"/>
               <a:t>Fifth level</a:t>
             </a:r>
             <a:endParaRPr lang="en-CA"/>
@@ -2720,7 +2736,7 @@
           <a:p>
             <a:fld id="{8CDD2D44-4ED8-47D5-8714-65D4F6D3A3A6}" type="datetimeFigureOut">
               <a:rPr lang="en-CA" smtClean="0"/>
-              <a:t>04/12/2012</a:t>
+              <a:t>2020-11-29</a:t>
             </a:fld>
             <a:endParaRPr lang="en-CA"/>
           </a:p>
@@ -3103,8 +3119,8 @@
         </p:nvSpPr>
         <p:spPr>
           <a:xfrm>
-            <a:off x="0" y="2895600"/>
-            <a:ext cx="9144000" cy="1752600"/>
+            <a:off x="34637" y="2895600"/>
+            <a:ext cx="9074726" cy="3733800"/>
           </a:xfrm>
           <a:prstGeom prst="snip2DiagRect">
             <a:avLst/>
@@ -3138,7 +3154,7 @@
           <a:p>
             <a:pPr algn="ctr"/>
             <a:r>
-              <a:rPr lang="en-US" sz="2800" b="1" i="1" dirty="0" smtClean="0">
+              <a:rPr lang="en-US" sz="2800" b="1" i="1" dirty="0">
                 <a:solidFill>
                   <a:schemeClr val="accent4"/>
                 </a:solidFill>
@@ -3147,13 +3163,34 @@
             </a:r>
           </a:p>
           <a:p>
-            <a:endParaRPr lang="en-US" dirty="0" smtClean="0"/>
-          </a:p>
-          <a:p>
             <a:endParaRPr lang="en-US" dirty="0"/>
           </a:p>
           <a:p>
-            <a:endParaRPr lang="en-US" dirty="0" smtClean="0"/>
+            <a:endParaRPr lang="en-US" dirty="0"/>
+          </a:p>
+          <a:p>
+            <a:endParaRPr lang="en-US" dirty="0"/>
+          </a:p>
+          <a:p>
+            <a:endParaRPr lang="en-US" dirty="0"/>
+          </a:p>
+          <a:p>
+            <a:endParaRPr lang="en-US" dirty="0"/>
+          </a:p>
+          <a:p>
+            <a:endParaRPr lang="en-US" dirty="0"/>
+          </a:p>
+          <a:p>
+            <a:endParaRPr lang="en-US" dirty="0"/>
+          </a:p>
+          <a:p>
+            <a:endParaRPr lang="en-US" dirty="0"/>
+          </a:p>
+          <a:p>
+            <a:endParaRPr lang="en-US" dirty="0"/>
+          </a:p>
+          <a:p>
+            <a:endParaRPr lang="en-US" dirty="0"/>
           </a:p>
           <a:p>
             <a:endParaRPr lang="en-US" dirty="0"/>
@@ -3188,10 +3225,34 @@
                 <a:tableStyleId>{5C22544A-7EE6-4342-B048-85BDC9FD1C3A}</a:tableStyleId>
               </a:tblPr>
               <a:tblGrid>
-                <a:gridCol w="1314450"/>
-                <a:gridCol w="1402080"/>
-                <a:gridCol w="1489710"/>
-                <a:gridCol w="2804160"/>
+                <a:gridCol w="1314450">
+                  <a:extLst>
+                    <a:ext uri="{9D8B030D-6E8A-4147-A177-3AD203B41FA5}">
+                      <a16:colId xmlns:a16="http://schemas.microsoft.com/office/drawing/2014/main" val="20000"/>
+                    </a:ext>
+                  </a:extLst>
+                </a:gridCol>
+                <a:gridCol w="1402080">
+                  <a:extLst>
+                    <a:ext uri="{9D8B030D-6E8A-4147-A177-3AD203B41FA5}">
+                      <a16:colId xmlns:a16="http://schemas.microsoft.com/office/drawing/2014/main" val="20001"/>
+                    </a:ext>
+                  </a:extLst>
+                </a:gridCol>
+                <a:gridCol w="1489710">
+                  <a:extLst>
+                    <a:ext uri="{9D8B030D-6E8A-4147-A177-3AD203B41FA5}">
+                      <a16:colId xmlns:a16="http://schemas.microsoft.com/office/drawing/2014/main" val="20002"/>
+                    </a:ext>
+                  </a:extLst>
+                </a:gridCol>
+                <a:gridCol w="2804160">
+                  <a:extLst>
+                    <a:ext uri="{9D8B030D-6E8A-4147-A177-3AD203B41FA5}">
+                      <a16:colId xmlns:a16="http://schemas.microsoft.com/office/drawing/2014/main" val="20003"/>
+                    </a:ext>
+                  </a:extLst>
+                </a:gridCol>
               </a:tblGrid>
               <a:tr h="370840">
                 <a:tc>
@@ -3200,7 +3261,7 @@
                     <a:lstStyle/>
                     <a:p>
                       <a:r>
-                        <a:rPr lang="en-US" dirty="0" err="1" smtClean="0"/>
+                        <a:rPr lang="en-US" dirty="0" err="1"/>
                         <a:t>PersonID</a:t>
                       </a:r>
                       <a:endParaRPr lang="en-CA" dirty="0"/>
@@ -3214,7 +3275,7 @@
                     <a:lstStyle/>
                     <a:p>
                       <a:r>
-                        <a:rPr lang="en-US" dirty="0" err="1" smtClean="0"/>
+                        <a:rPr lang="en-US" dirty="0" err="1"/>
                         <a:t>FirstName</a:t>
                       </a:r>
                       <a:endParaRPr lang="en-CA" dirty="0"/>
@@ -3228,7 +3289,7 @@
                     <a:lstStyle/>
                     <a:p>
                       <a:r>
-                        <a:rPr lang="en-US" dirty="0" err="1" smtClean="0"/>
+                        <a:rPr lang="en-US" dirty="0" err="1"/>
                         <a:t>LastName</a:t>
                       </a:r>
                       <a:endParaRPr lang="en-CA" dirty="0"/>
@@ -3242,7 +3303,7 @@
                     <a:lstStyle/>
                     <a:p>
                       <a:r>
-                        <a:rPr lang="en-US" dirty="0" err="1" smtClean="0"/>
+                        <a:rPr lang="en-US" dirty="0" err="1"/>
                         <a:t>DateOfBirth</a:t>
                       </a:r>
                       <a:endParaRPr lang="en-CA" dirty="0"/>
@@ -3250,6 +3311,11 @@
                   </a:txBody>
                   <a:tcPr/>
                 </a:tc>
+                <a:extLst>
+                  <a:ext uri="{0D108BD9-81ED-4DB2-BD59-A6C34878D82A}">
+                    <a16:rowId xmlns:a16="http://schemas.microsoft.com/office/drawing/2014/main" val="10000"/>
+                  </a:ext>
+                </a:extLst>
               </a:tr>
               <a:tr h="370840">
                 <a:tc>
@@ -3258,7 +3324,7 @@
                     <a:lstStyle/>
                     <a:p>
                       <a:r>
-                        <a:rPr lang="en-US" dirty="0" smtClean="0"/>
+                        <a:rPr lang="en-US" dirty="0"/>
                         <a:t>1</a:t>
                       </a:r>
                       <a:endParaRPr lang="en-CA" dirty="0"/>
@@ -3272,7 +3338,7 @@
                     <a:lstStyle/>
                     <a:p>
                       <a:r>
-                        <a:rPr lang="en-US" dirty="0" smtClean="0"/>
+                        <a:rPr lang="en-US" dirty="0"/>
                         <a:t>Fred</a:t>
                       </a:r>
                       <a:endParaRPr lang="en-CA" dirty="0"/>
@@ -3286,7 +3352,7 @@
                     <a:lstStyle/>
                     <a:p>
                       <a:r>
-                        <a:rPr lang="en-US" dirty="0" smtClean="0"/>
+                        <a:rPr lang="en-US" dirty="0"/>
                         <a:t>Flintstone</a:t>
                       </a:r>
                       <a:endParaRPr lang="en-CA" dirty="0"/>
@@ -3300,14 +3366,18 @@
                     <a:lstStyle/>
                     <a:p>
                       <a:r>
-                        <a:rPr lang="en-CA" dirty="0" smtClean="0"/>
+                        <a:rPr lang="en-CA" dirty="0"/>
                         <a:t>1900-05-05 00:00:00.000</a:t>
                       </a:r>
-                      <a:endParaRPr lang="en-CA" dirty="0"/>
                     </a:p>
                   </a:txBody>
                   <a:tcPr/>
                 </a:tc>
+                <a:extLst>
+                  <a:ext uri="{0D108BD9-81ED-4DB2-BD59-A6C34878D82A}">
+                    <a16:rowId xmlns:a16="http://schemas.microsoft.com/office/drawing/2014/main" val="10001"/>
+                  </a:ext>
+                </a:extLst>
               </a:tr>
               <a:tr h="370840">
                 <a:tc>
@@ -3316,7 +3386,7 @@
                     <a:lstStyle/>
                     <a:p>
                       <a:r>
-                        <a:rPr lang="en-US" dirty="0" smtClean="0"/>
+                        <a:rPr lang="en-US" dirty="0"/>
                         <a:t>2</a:t>
                       </a:r>
                       <a:endParaRPr lang="en-CA" dirty="0"/>
@@ -3330,7 +3400,7 @@
                     <a:lstStyle/>
                     <a:p>
                       <a:r>
-                        <a:rPr lang="en-US" dirty="0" smtClean="0"/>
+                        <a:rPr lang="en-US" dirty="0"/>
                         <a:t>Wilma</a:t>
                       </a:r>
                       <a:endParaRPr lang="en-CA" dirty="0"/>
@@ -3344,7 +3414,7 @@
                     <a:lstStyle/>
                     <a:p>
                       <a:r>
-                        <a:rPr lang="en-US" dirty="0" err="1" smtClean="0"/>
+                        <a:rPr lang="en-US" dirty="0" err="1"/>
                         <a:t>Slaghoople</a:t>
                       </a:r>
                       <a:endParaRPr lang="en-CA" dirty="0"/>
@@ -3358,14 +3428,18 @@
                     <a:lstStyle/>
                     <a:p>
                       <a:r>
-                        <a:rPr lang="en-CA" dirty="0" smtClean="0"/>
+                        <a:rPr lang="en-CA" dirty="0"/>
                         <a:t>1905-07-14 00:00:00.000</a:t>
                       </a:r>
-                      <a:endParaRPr lang="en-CA" dirty="0"/>
                     </a:p>
                   </a:txBody>
                   <a:tcPr/>
                 </a:tc>
+                <a:extLst>
+                  <a:ext uri="{0D108BD9-81ED-4DB2-BD59-A6C34878D82A}">
+                    <a16:rowId xmlns:a16="http://schemas.microsoft.com/office/drawing/2014/main" val="10002"/>
+                  </a:ext>
+                </a:extLst>
               </a:tr>
             </a:tbl>
           </a:graphicData>
@@ -3398,7 +3472,7 @@
               </a:lnSpc>
             </a:pPr>
             <a:r>
-              <a:rPr lang="en-CA" dirty="0" smtClean="0">
+              <a:rPr lang="en-CA" b="1" dirty="0">
                 <a:solidFill>
                   <a:srgbClr val="0000FF"/>
                 </a:solidFill>
@@ -3410,7 +3484,7 @@
               <a:t>UPDATE</a:t>
             </a:r>
             <a:r>
-              <a:rPr lang="en-CA" dirty="0" smtClean="0">
+              <a:rPr lang="en-CA" b="1" dirty="0">
                 <a:effectLst/>
                 <a:latin typeface="Courier New"/>
                 <a:ea typeface="Calibri"/>
@@ -3419,7 +3493,7 @@
               <a:t> Person </a:t>
             </a:r>
             <a:r>
-              <a:rPr lang="en-CA" dirty="0" smtClean="0">
+              <a:rPr lang="en-CA" b="1" dirty="0">
                 <a:solidFill>
                   <a:srgbClr val="0000FF"/>
                 </a:solidFill>
@@ -3431,7 +3505,7 @@
               <a:t>SET</a:t>
             </a:r>
             <a:r>
-              <a:rPr lang="en-CA" dirty="0" smtClean="0">
+              <a:rPr lang="en-CA" b="1" dirty="0">
                 <a:effectLst/>
                 <a:latin typeface="Courier New"/>
                 <a:ea typeface="Calibri"/>
@@ -3440,7 +3514,7 @@
               <a:t> </a:t>
             </a:r>
             <a:r>
-              <a:rPr lang="en-CA" dirty="0" err="1" smtClean="0">
+              <a:rPr lang="en-CA" b="1" dirty="0" err="1">
                 <a:effectLst/>
                 <a:latin typeface="Courier New"/>
                 <a:ea typeface="Calibri"/>
@@ -3449,7 +3523,7 @@
               <a:t>LastName</a:t>
             </a:r>
             <a:r>
-              <a:rPr lang="en-CA" dirty="0" smtClean="0">
+              <a:rPr lang="en-CA" b="1" dirty="0">
                 <a:effectLst/>
                 <a:latin typeface="Courier New"/>
                 <a:ea typeface="Calibri"/>
@@ -3458,7 +3532,7 @@
               <a:t> </a:t>
             </a:r>
             <a:r>
-              <a:rPr lang="en-CA" dirty="0" smtClean="0">
+              <a:rPr lang="en-CA" b="1" dirty="0">
                 <a:solidFill>
                   <a:srgbClr val="808080"/>
                 </a:solidFill>
@@ -3470,7 +3544,7 @@
               <a:t>=</a:t>
             </a:r>
             <a:r>
-              <a:rPr lang="en-CA" dirty="0" smtClean="0">
+              <a:rPr lang="en-CA" b="1" dirty="0">
                 <a:effectLst/>
                 <a:latin typeface="Courier New"/>
                 <a:ea typeface="Calibri"/>
@@ -3479,7 +3553,7 @@
               <a:t> </a:t>
             </a:r>
             <a:r>
-              <a:rPr lang="en-CA" dirty="0" smtClean="0">
+              <a:rPr lang="en-CA" b="1" dirty="0">
                 <a:solidFill>
                   <a:srgbClr val="FF0000"/>
                 </a:solidFill>
@@ -3490,7 +3564,7 @@
               </a:rPr>
               <a:t>'Flintstone'</a:t>
             </a:r>
-            <a:endParaRPr lang="en-CA" sz="1400" dirty="0">
+            <a:endParaRPr lang="en-CA" sz="1400" b="1" dirty="0">
               <a:ea typeface="Calibri"/>
               <a:cs typeface="Times New Roman"/>
             </a:endParaRPr>
@@ -3505,7 +3579,7 @@
               </a:spcAft>
             </a:pPr>
             <a:r>
-              <a:rPr lang="en-CA" dirty="0" smtClean="0">
+              <a:rPr lang="en-CA" b="1" dirty="0">
                 <a:solidFill>
                   <a:srgbClr val="0000FF"/>
                 </a:solidFill>
@@ -3517,7 +3591,7 @@
               <a:t>WHERE</a:t>
             </a:r>
             <a:r>
-              <a:rPr lang="en-CA" dirty="0" smtClean="0">
+              <a:rPr lang="en-CA" b="1" dirty="0">
                 <a:effectLst/>
                 <a:latin typeface="Courier New"/>
                 <a:ea typeface="Calibri"/>
@@ -3526,7 +3600,7 @@
               <a:t>  </a:t>
             </a:r>
             <a:r>
-              <a:rPr lang="en-CA" dirty="0" err="1" smtClean="0">
+              <a:rPr lang="en-CA" b="1" dirty="0" err="1">
                 <a:effectLst/>
                 <a:latin typeface="Courier New"/>
                 <a:ea typeface="Calibri"/>
@@ -3535,7 +3609,7 @@
               <a:t>FirstName</a:t>
             </a:r>
             <a:r>
-              <a:rPr lang="en-CA" dirty="0" smtClean="0">
+              <a:rPr lang="en-CA" b="1" dirty="0">
                 <a:effectLst/>
                 <a:latin typeface="Courier New"/>
                 <a:ea typeface="Calibri"/>
@@ -3544,7 +3618,7 @@
               <a:t> </a:t>
             </a:r>
             <a:r>
-              <a:rPr lang="en-CA" dirty="0" smtClean="0">
+              <a:rPr lang="en-CA" b="1" dirty="0">
                 <a:solidFill>
                   <a:srgbClr val="808080"/>
                 </a:solidFill>
@@ -3556,7 +3630,7 @@
               <a:t>=</a:t>
             </a:r>
             <a:r>
-              <a:rPr lang="en-CA" dirty="0" smtClean="0">
+              <a:rPr lang="en-CA" b="1" dirty="0">
                 <a:effectLst/>
                 <a:latin typeface="Courier New"/>
                 <a:ea typeface="Calibri"/>
@@ -3565,7 +3639,7 @@
               <a:t> </a:t>
             </a:r>
             <a:r>
-              <a:rPr lang="en-CA" dirty="0" smtClean="0">
+              <a:rPr lang="en-CA" b="1" dirty="0">
                 <a:solidFill>
                   <a:srgbClr val="FF0000"/>
                 </a:solidFill>
@@ -3577,7 +3651,7 @@
               <a:t>'Wilma'</a:t>
             </a:r>
             <a:r>
-              <a:rPr lang="en-CA" dirty="0" smtClean="0">
+              <a:rPr lang="en-CA" b="1" dirty="0">
                 <a:effectLst/>
                 <a:latin typeface="Courier New"/>
                 <a:ea typeface="Calibri"/>
@@ -3586,7 +3660,7 @@
               <a:t> </a:t>
             </a:r>
             <a:r>
-              <a:rPr lang="en-CA" dirty="0" smtClean="0">
+              <a:rPr lang="en-CA" b="1" dirty="0">
                 <a:solidFill>
                   <a:srgbClr val="808080"/>
                 </a:solidFill>
@@ -3598,7 +3672,7 @@
               <a:t>AND</a:t>
             </a:r>
             <a:r>
-              <a:rPr lang="en-CA" dirty="0" smtClean="0">
+              <a:rPr lang="en-CA" b="1" dirty="0">
                 <a:effectLst/>
                 <a:latin typeface="Courier New"/>
                 <a:ea typeface="Calibri"/>
@@ -3607,7 +3681,7 @@
               <a:t> </a:t>
             </a:r>
             <a:r>
-              <a:rPr lang="en-CA" dirty="0" err="1" smtClean="0">
+              <a:rPr lang="en-CA" b="1" dirty="0" err="1">
                 <a:effectLst/>
                 <a:latin typeface="Courier New"/>
                 <a:ea typeface="Calibri"/>
@@ -3616,7 +3690,7 @@
               <a:t>LastName</a:t>
             </a:r>
             <a:r>
-              <a:rPr lang="en-CA" dirty="0" smtClean="0">
+              <a:rPr lang="en-CA" b="1" dirty="0">
                 <a:effectLst/>
                 <a:latin typeface="Courier New"/>
                 <a:ea typeface="Calibri"/>
@@ -3625,7 +3699,7 @@
               <a:t> </a:t>
             </a:r>
             <a:r>
-              <a:rPr lang="en-CA" dirty="0" smtClean="0">
+              <a:rPr lang="en-CA" b="1" dirty="0">
                 <a:solidFill>
                   <a:srgbClr val="808080"/>
                 </a:solidFill>
@@ -3637,7 +3711,7 @@
               <a:t>=</a:t>
             </a:r>
             <a:r>
-              <a:rPr lang="en-CA" dirty="0" smtClean="0">
+              <a:rPr lang="en-CA" b="1" dirty="0">
                 <a:effectLst/>
                 <a:latin typeface="Courier New"/>
                 <a:ea typeface="Calibri"/>
@@ -3646,7 +3720,7 @@
               <a:t> </a:t>
             </a:r>
             <a:r>
-              <a:rPr lang="en-CA" dirty="0" smtClean="0">
+              <a:rPr lang="en-CA" b="1" dirty="0">
                 <a:solidFill>
                   <a:srgbClr val="FF0000"/>
                 </a:solidFill>
@@ -3658,7 +3732,7 @@
               <a:t>'</a:t>
             </a:r>
             <a:r>
-              <a:rPr lang="en-CA" dirty="0" err="1" smtClean="0">
+              <a:rPr lang="en-CA" b="1" dirty="0" err="1">
                 <a:solidFill>
                   <a:srgbClr val="FF0000"/>
                 </a:solidFill>
@@ -3670,7 +3744,7 @@
               <a:t>Slaghoople</a:t>
             </a:r>
             <a:r>
-              <a:rPr lang="en-CA" dirty="0" smtClean="0">
+              <a:rPr lang="en-CA" b="1" dirty="0">
                 <a:solidFill>
                   <a:srgbClr val="FF0000"/>
                 </a:solidFill>
@@ -3681,7 +3755,7 @@
               </a:rPr>
               <a:t>'</a:t>
             </a:r>
-            <a:endParaRPr lang="en-CA" sz="1400" dirty="0">
+            <a:endParaRPr lang="en-CA" sz="1400" b="1" dirty="0">
               <a:ea typeface="Calibri"/>
               <a:cs typeface="Times New Roman"/>
             </a:endParaRPr>
@@ -3697,13 +3771,13 @@
           <p:nvPr>
             <p:extLst>
               <p:ext uri="{D42A27DB-BD31-4B8C-83A1-F6EECF244321}">
-                <p14:modId xmlns:p14="http://schemas.microsoft.com/office/powerpoint/2010/main" val="1606244224"/>
+                <p14:modId xmlns:p14="http://schemas.microsoft.com/office/powerpoint/2010/main" val="1645301355"/>
               </p:ext>
             </p:extLst>
           </p:nvPr>
         </p:nvGraphicFramePr>
         <p:xfrm>
-          <a:off x="34637" y="3657294"/>
+          <a:off x="76200" y="3657294"/>
           <a:ext cx="4461163" cy="625464"/>
         </p:xfrm>
         <a:graphic>
@@ -3713,10 +3787,34 @@
                 <a:tableStyleId>{5C22544A-7EE6-4342-B048-85BDC9FD1C3A}</a:tableStyleId>
               </a:tblPr>
               <a:tblGrid>
-                <a:gridCol w="836468"/>
-                <a:gridCol w="892233"/>
-                <a:gridCol w="947997"/>
-                <a:gridCol w="1784465"/>
+                <a:gridCol w="836468">
+                  <a:extLst>
+                    <a:ext uri="{9D8B030D-6E8A-4147-A177-3AD203B41FA5}">
+                      <a16:colId xmlns:a16="http://schemas.microsoft.com/office/drawing/2014/main" val="20000"/>
+                    </a:ext>
+                  </a:extLst>
+                </a:gridCol>
+                <a:gridCol w="892233">
+                  <a:extLst>
+                    <a:ext uri="{9D8B030D-6E8A-4147-A177-3AD203B41FA5}">
+                      <a16:colId xmlns:a16="http://schemas.microsoft.com/office/drawing/2014/main" val="20001"/>
+                    </a:ext>
+                  </a:extLst>
+                </a:gridCol>
+                <a:gridCol w="947997">
+                  <a:extLst>
+                    <a:ext uri="{9D8B030D-6E8A-4147-A177-3AD203B41FA5}">
+                      <a16:colId xmlns:a16="http://schemas.microsoft.com/office/drawing/2014/main" val="20002"/>
+                    </a:ext>
+                  </a:extLst>
+                </a:gridCol>
+                <a:gridCol w="1784465">
+                  <a:extLst>
+                    <a:ext uri="{9D8B030D-6E8A-4147-A177-3AD203B41FA5}">
+                      <a16:colId xmlns:a16="http://schemas.microsoft.com/office/drawing/2014/main" val="20003"/>
+                    </a:ext>
+                  </a:extLst>
+                </a:gridCol>
               </a:tblGrid>
               <a:tr h="312732">
                 <a:tc>
@@ -3725,7 +3823,7 @@
                     <a:lstStyle/>
                     <a:p>
                       <a:r>
-                        <a:rPr lang="en-US" sz="1200" b="1" dirty="0" err="1" smtClean="0"/>
+                        <a:rPr lang="en-US" sz="1200" b="1" dirty="0" err="1"/>
                         <a:t>PersonID</a:t>
                       </a:r>
                       <a:endParaRPr lang="en-CA" sz="1200" b="1" dirty="0"/>
@@ -3739,7 +3837,7 @@
                     <a:lstStyle/>
                     <a:p>
                       <a:r>
-                        <a:rPr lang="en-US" sz="1200" b="1" dirty="0" err="1" smtClean="0"/>
+                        <a:rPr lang="en-US" sz="1200" b="1" dirty="0" err="1"/>
                         <a:t>FirstName</a:t>
                       </a:r>
                       <a:endParaRPr lang="en-CA" sz="1200" b="1" dirty="0"/>
@@ -3753,7 +3851,7 @@
                     <a:lstStyle/>
                     <a:p>
                       <a:r>
-                        <a:rPr lang="en-US" sz="1200" b="1" dirty="0" err="1" smtClean="0"/>
+                        <a:rPr lang="en-US" sz="1200" b="1" dirty="0" err="1"/>
                         <a:t>LastName</a:t>
                       </a:r>
                       <a:endParaRPr lang="en-CA" sz="1200" b="1" dirty="0"/>
@@ -3767,7 +3865,7 @@
                     <a:lstStyle/>
                     <a:p>
                       <a:r>
-                        <a:rPr lang="en-US" sz="1200" b="1" dirty="0" err="1" smtClean="0"/>
+                        <a:rPr lang="en-US" sz="1200" b="1" dirty="0" err="1"/>
                         <a:t>DateOfBirth</a:t>
                       </a:r>
                       <a:endParaRPr lang="en-CA" sz="1200" b="1" dirty="0"/>
@@ -3775,6 +3873,11 @@
                   </a:txBody>
                   <a:tcPr/>
                 </a:tc>
+                <a:extLst>
+                  <a:ext uri="{0D108BD9-81ED-4DB2-BD59-A6C34878D82A}">
+                    <a16:rowId xmlns:a16="http://schemas.microsoft.com/office/drawing/2014/main" val="10000"/>
+                  </a:ext>
+                </a:extLst>
               </a:tr>
               <a:tr h="312732">
                 <a:tc>
@@ -3783,7 +3886,7 @@
                     <a:lstStyle/>
                     <a:p>
                       <a:r>
-                        <a:rPr lang="en-US" sz="1200" b="1" dirty="0" smtClean="0"/>
+                        <a:rPr lang="en-US" sz="1200" b="1" dirty="0"/>
                         <a:t>2</a:t>
                       </a:r>
                       <a:endParaRPr lang="en-CA" sz="1200" b="1" dirty="0"/>
@@ -3797,7 +3900,7 @@
                     <a:lstStyle/>
                     <a:p>
                       <a:r>
-                        <a:rPr lang="en-US" sz="1200" b="1" dirty="0" smtClean="0"/>
+                        <a:rPr lang="en-US" sz="1200" b="1" dirty="0"/>
                         <a:t>Wilma</a:t>
                       </a:r>
                       <a:endParaRPr lang="en-CA" sz="1200" b="1" dirty="0"/>
@@ -3811,7 +3914,7 @@
                     <a:lstStyle/>
                     <a:p>
                       <a:r>
-                        <a:rPr lang="en-US" sz="1200" b="1" dirty="0" err="1" smtClean="0"/>
+                        <a:rPr lang="en-US" sz="1200" b="1" dirty="0" err="1"/>
                         <a:t>Slaghoople</a:t>
                       </a:r>
                       <a:endParaRPr lang="en-CA" sz="1200" b="1" dirty="0"/>
@@ -3825,14 +3928,18 @@
                     <a:lstStyle/>
                     <a:p>
                       <a:r>
-                        <a:rPr lang="en-CA" sz="1200" b="1" dirty="0" smtClean="0"/>
+                        <a:rPr lang="en-CA" sz="1200" b="1" dirty="0"/>
                         <a:t>1905-07-14 00:00:00.000</a:t>
                       </a:r>
-                      <a:endParaRPr lang="en-CA" sz="1200" b="1" dirty="0"/>
                     </a:p>
                   </a:txBody>
                   <a:tcPr/>
                 </a:tc>
+                <a:extLst>
+                  <a:ext uri="{0D108BD9-81ED-4DB2-BD59-A6C34878D82A}">
+                    <a16:rowId xmlns:a16="http://schemas.microsoft.com/office/drawing/2014/main" val="10001"/>
+                  </a:ext>
+                </a:extLst>
               </a:tr>
             </a:tbl>
           </a:graphicData>
@@ -3861,7 +3968,7 @@
           <a:lstStyle/>
           <a:p>
             <a:r>
-              <a:rPr lang="en-US" sz="2400" b="1" dirty="0" smtClean="0">
+              <a:rPr lang="en-US" sz="2400" b="1" dirty="0">
                 <a:solidFill>
                   <a:schemeClr val="tx2"/>
                 </a:solidFill>
@@ -3884,7 +3991,7 @@
         </p:nvSpPr>
         <p:spPr>
           <a:xfrm>
-            <a:off x="4648200" y="3200400"/>
+            <a:off x="4572000" y="3200400"/>
             <a:ext cx="1600200" cy="461665"/>
           </a:xfrm>
           <a:prstGeom prst="rect">
@@ -3899,7 +4006,7 @@
           <a:lstStyle/>
           <a:p>
             <a:r>
-              <a:rPr lang="en-US" sz="2400" b="1" dirty="0" smtClean="0">
+              <a:rPr lang="en-US" sz="2400" b="1" dirty="0">
                 <a:solidFill>
                   <a:schemeClr val="tx2"/>
                 </a:solidFill>
@@ -3923,13 +4030,13 @@
           <p:nvPr>
             <p:extLst>
               <p:ext uri="{D42A27DB-BD31-4B8C-83A1-F6EECF244321}">
-                <p14:modId xmlns:p14="http://schemas.microsoft.com/office/powerpoint/2010/main" val="1676096487"/>
+                <p14:modId xmlns:p14="http://schemas.microsoft.com/office/powerpoint/2010/main" val="642864230"/>
               </p:ext>
             </p:extLst>
           </p:nvPr>
         </p:nvGraphicFramePr>
         <p:xfrm>
-          <a:off x="4648200" y="3657294"/>
+          <a:off x="4606637" y="3657294"/>
           <a:ext cx="4461163" cy="625464"/>
         </p:xfrm>
         <a:graphic>
@@ -3939,10 +4046,34 @@
                 <a:tableStyleId>{5C22544A-7EE6-4342-B048-85BDC9FD1C3A}</a:tableStyleId>
               </a:tblPr>
               <a:tblGrid>
-                <a:gridCol w="836468"/>
-                <a:gridCol w="892233"/>
-                <a:gridCol w="947997"/>
-                <a:gridCol w="1784465"/>
+                <a:gridCol w="836468">
+                  <a:extLst>
+                    <a:ext uri="{9D8B030D-6E8A-4147-A177-3AD203B41FA5}">
+                      <a16:colId xmlns:a16="http://schemas.microsoft.com/office/drawing/2014/main" val="20000"/>
+                    </a:ext>
+                  </a:extLst>
+                </a:gridCol>
+                <a:gridCol w="892233">
+                  <a:extLst>
+                    <a:ext uri="{9D8B030D-6E8A-4147-A177-3AD203B41FA5}">
+                      <a16:colId xmlns:a16="http://schemas.microsoft.com/office/drawing/2014/main" val="20001"/>
+                    </a:ext>
+                  </a:extLst>
+                </a:gridCol>
+                <a:gridCol w="947997">
+                  <a:extLst>
+                    <a:ext uri="{9D8B030D-6E8A-4147-A177-3AD203B41FA5}">
+                      <a16:colId xmlns:a16="http://schemas.microsoft.com/office/drawing/2014/main" val="20002"/>
+                    </a:ext>
+                  </a:extLst>
+                </a:gridCol>
+                <a:gridCol w="1784465">
+                  <a:extLst>
+                    <a:ext uri="{9D8B030D-6E8A-4147-A177-3AD203B41FA5}">
+                      <a16:colId xmlns:a16="http://schemas.microsoft.com/office/drawing/2014/main" val="20003"/>
+                    </a:ext>
+                  </a:extLst>
+                </a:gridCol>
               </a:tblGrid>
               <a:tr h="312732">
                 <a:tc>
@@ -3951,7 +4082,7 @@
                     <a:lstStyle/>
                     <a:p>
                       <a:r>
-                        <a:rPr lang="en-US" sz="1200" b="1" dirty="0" err="1" smtClean="0"/>
+                        <a:rPr lang="en-US" sz="1200" b="1" dirty="0" err="1"/>
                         <a:t>PersonID</a:t>
                       </a:r>
                       <a:endParaRPr lang="en-CA" sz="1200" b="1" dirty="0"/>
@@ -3965,7 +4096,7 @@
                     <a:lstStyle/>
                     <a:p>
                       <a:r>
-                        <a:rPr lang="en-US" sz="1200" b="1" dirty="0" err="1" smtClean="0"/>
+                        <a:rPr lang="en-US" sz="1200" b="1" dirty="0" err="1"/>
                         <a:t>FirstName</a:t>
                       </a:r>
                       <a:endParaRPr lang="en-CA" sz="1200" b="1" dirty="0"/>
@@ -3979,7 +4110,7 @@
                     <a:lstStyle/>
                     <a:p>
                       <a:r>
-                        <a:rPr lang="en-US" sz="1200" b="1" dirty="0" err="1" smtClean="0"/>
+                        <a:rPr lang="en-US" sz="1200" b="1" dirty="0" err="1"/>
                         <a:t>LastName</a:t>
                       </a:r>
                       <a:endParaRPr lang="en-CA" sz="1200" b="1" dirty="0"/>
@@ -3993,7 +4124,7 @@
                     <a:lstStyle/>
                     <a:p>
                       <a:r>
-                        <a:rPr lang="en-US" sz="1200" b="1" dirty="0" err="1" smtClean="0"/>
+                        <a:rPr lang="en-US" sz="1200" b="1" dirty="0" err="1"/>
                         <a:t>DateOfBirth</a:t>
                       </a:r>
                       <a:endParaRPr lang="en-CA" sz="1200" b="1" dirty="0"/>
@@ -4001,6 +4132,11 @@
                   </a:txBody>
                   <a:tcPr/>
                 </a:tc>
+                <a:extLst>
+                  <a:ext uri="{0D108BD9-81ED-4DB2-BD59-A6C34878D82A}">
+                    <a16:rowId xmlns:a16="http://schemas.microsoft.com/office/drawing/2014/main" val="10000"/>
+                  </a:ext>
+                </a:extLst>
               </a:tr>
               <a:tr h="312732">
                 <a:tc>
@@ -4009,7 +4145,7 @@
                     <a:lstStyle/>
                     <a:p>
                       <a:r>
-                        <a:rPr lang="en-US" sz="1200" b="1" dirty="0" smtClean="0"/>
+                        <a:rPr lang="en-US" sz="1200" b="1" dirty="0"/>
                         <a:t>2</a:t>
                       </a:r>
                       <a:endParaRPr lang="en-CA" sz="1200" b="1" dirty="0"/>
@@ -4023,7 +4159,7 @@
                     <a:lstStyle/>
                     <a:p>
                       <a:r>
-                        <a:rPr lang="en-US" sz="1200" b="1" dirty="0" smtClean="0"/>
+                        <a:rPr lang="en-US" sz="1200" b="1" dirty="0"/>
                         <a:t>Wilma</a:t>
                       </a:r>
                       <a:endParaRPr lang="en-CA" sz="1200" b="1" dirty="0"/>
@@ -4037,7 +4173,7 @@
                     <a:lstStyle/>
                     <a:p>
                       <a:r>
-                        <a:rPr lang="en-US" sz="1200" b="1" dirty="0" smtClean="0"/>
+                        <a:rPr lang="en-US" sz="1200" b="1" dirty="0"/>
                         <a:t>Flintstone</a:t>
                       </a:r>
                       <a:endParaRPr lang="en-CA" sz="1200" b="1" dirty="0"/>
@@ -4051,14 +4187,18 @@
                     <a:lstStyle/>
                     <a:p>
                       <a:r>
-                        <a:rPr lang="en-CA" sz="1200" b="1" dirty="0" smtClean="0"/>
+                        <a:rPr lang="en-CA" sz="1200" b="1" dirty="0"/>
                         <a:t>1905-07-14 00:00:00.000</a:t>
                       </a:r>
-                      <a:endParaRPr lang="en-CA" sz="1200" b="1" dirty="0"/>
                     </a:p>
                   </a:txBody>
                   <a:tcPr/>
                 </a:tc>
+                <a:extLst>
+                  <a:ext uri="{0D108BD9-81ED-4DB2-BD59-A6C34878D82A}">
+                    <a16:rowId xmlns:a16="http://schemas.microsoft.com/office/drawing/2014/main" val="10001"/>
+                  </a:ext>
+                </a:extLst>
               </a:tr>
             </a:tbl>
           </a:graphicData>
@@ -4087,7 +4227,7 @@
           <a:lstStyle/>
           <a:p>
             <a:r>
-              <a:rPr lang="en-US" sz="2400" b="1" dirty="0" smtClean="0">
+              <a:rPr lang="en-US" sz="2400" b="1" dirty="0">
                 <a:solidFill>
                   <a:schemeClr val="tx2"/>
                 </a:solidFill>
@@ -4127,10 +4267,34 @@
                 <a:tableStyleId>{5C22544A-7EE6-4342-B048-85BDC9FD1C3A}</a:tableStyleId>
               </a:tblPr>
               <a:tblGrid>
-                <a:gridCol w="1314450"/>
-                <a:gridCol w="1402080"/>
-                <a:gridCol w="1489710"/>
-                <a:gridCol w="2804160"/>
+                <a:gridCol w="1314450">
+                  <a:extLst>
+                    <a:ext uri="{9D8B030D-6E8A-4147-A177-3AD203B41FA5}">
+                      <a16:colId xmlns:a16="http://schemas.microsoft.com/office/drawing/2014/main" val="20000"/>
+                    </a:ext>
+                  </a:extLst>
+                </a:gridCol>
+                <a:gridCol w="1402080">
+                  <a:extLst>
+                    <a:ext uri="{9D8B030D-6E8A-4147-A177-3AD203B41FA5}">
+                      <a16:colId xmlns:a16="http://schemas.microsoft.com/office/drawing/2014/main" val="20001"/>
+                    </a:ext>
+                  </a:extLst>
+                </a:gridCol>
+                <a:gridCol w="1489710">
+                  <a:extLst>
+                    <a:ext uri="{9D8B030D-6E8A-4147-A177-3AD203B41FA5}">
+                      <a16:colId xmlns:a16="http://schemas.microsoft.com/office/drawing/2014/main" val="20002"/>
+                    </a:ext>
+                  </a:extLst>
+                </a:gridCol>
+                <a:gridCol w="2804160">
+                  <a:extLst>
+                    <a:ext uri="{9D8B030D-6E8A-4147-A177-3AD203B41FA5}">
+                      <a16:colId xmlns:a16="http://schemas.microsoft.com/office/drawing/2014/main" val="20003"/>
+                    </a:ext>
+                  </a:extLst>
+                </a:gridCol>
               </a:tblGrid>
               <a:tr h="370840">
                 <a:tc>
@@ -4139,7 +4303,7 @@
                     <a:lstStyle/>
                     <a:p>
                       <a:r>
-                        <a:rPr lang="en-US" dirty="0" err="1" smtClean="0"/>
+                        <a:rPr lang="en-US" dirty="0" err="1"/>
                         <a:t>PersonID</a:t>
                       </a:r>
                       <a:endParaRPr lang="en-CA" dirty="0"/>
@@ -4153,7 +4317,7 @@
                     <a:lstStyle/>
                     <a:p>
                       <a:r>
-                        <a:rPr lang="en-US" dirty="0" err="1" smtClean="0"/>
+                        <a:rPr lang="en-US" dirty="0" err="1"/>
                         <a:t>FirstName</a:t>
                       </a:r>
                       <a:endParaRPr lang="en-CA" dirty="0"/>
@@ -4167,7 +4331,7 @@
                     <a:lstStyle/>
                     <a:p>
                       <a:r>
-                        <a:rPr lang="en-US" dirty="0" err="1" smtClean="0"/>
+                        <a:rPr lang="en-US" dirty="0" err="1"/>
                         <a:t>LastName</a:t>
                       </a:r>
                       <a:endParaRPr lang="en-CA" dirty="0"/>
@@ -4181,7 +4345,7 @@
                     <a:lstStyle/>
                     <a:p>
                       <a:r>
-                        <a:rPr lang="en-US" dirty="0" err="1" smtClean="0"/>
+                        <a:rPr lang="en-US" dirty="0" err="1"/>
                         <a:t>DateOfBirth</a:t>
                       </a:r>
                       <a:endParaRPr lang="en-CA" dirty="0"/>
@@ -4189,6 +4353,11 @@
                   </a:txBody>
                   <a:tcPr/>
                 </a:tc>
+                <a:extLst>
+                  <a:ext uri="{0D108BD9-81ED-4DB2-BD59-A6C34878D82A}">
+                    <a16:rowId xmlns:a16="http://schemas.microsoft.com/office/drawing/2014/main" val="10000"/>
+                  </a:ext>
+                </a:extLst>
               </a:tr>
               <a:tr h="370840">
                 <a:tc>
@@ -4197,7 +4366,7 @@
                     <a:lstStyle/>
                     <a:p>
                       <a:r>
-                        <a:rPr lang="en-US" dirty="0" smtClean="0"/>
+                        <a:rPr lang="en-US" dirty="0"/>
                         <a:t>1</a:t>
                       </a:r>
                       <a:endParaRPr lang="en-CA" dirty="0"/>
@@ -4211,7 +4380,7 @@
                     <a:lstStyle/>
                     <a:p>
                       <a:r>
-                        <a:rPr lang="en-US" dirty="0" smtClean="0"/>
+                        <a:rPr lang="en-US" dirty="0"/>
                         <a:t>Fred</a:t>
                       </a:r>
                       <a:endParaRPr lang="en-CA" dirty="0"/>
@@ -4225,7 +4394,7 @@
                     <a:lstStyle/>
                     <a:p>
                       <a:r>
-                        <a:rPr lang="en-US" dirty="0" smtClean="0"/>
+                        <a:rPr lang="en-US" dirty="0"/>
                         <a:t>Flintstone</a:t>
                       </a:r>
                       <a:endParaRPr lang="en-CA" dirty="0"/>
@@ -4239,14 +4408,18 @@
                     <a:lstStyle/>
                     <a:p>
                       <a:r>
-                        <a:rPr lang="en-CA" dirty="0" smtClean="0"/>
+                        <a:rPr lang="en-CA" dirty="0"/>
                         <a:t>1900-05-05 00:00:00.000</a:t>
                       </a:r>
-                      <a:endParaRPr lang="en-CA" dirty="0"/>
                     </a:p>
                   </a:txBody>
                   <a:tcPr/>
                 </a:tc>
+                <a:extLst>
+                  <a:ext uri="{0D108BD9-81ED-4DB2-BD59-A6C34878D82A}">
+                    <a16:rowId xmlns:a16="http://schemas.microsoft.com/office/drawing/2014/main" val="10001"/>
+                  </a:ext>
+                </a:extLst>
               </a:tr>
               <a:tr h="370840">
                 <a:tc>
@@ -4255,7 +4428,7 @@
                     <a:lstStyle/>
                     <a:p>
                       <a:r>
-                        <a:rPr lang="en-US" dirty="0" smtClean="0"/>
+                        <a:rPr lang="en-US" dirty="0"/>
                         <a:t>2</a:t>
                       </a:r>
                       <a:endParaRPr lang="en-CA" dirty="0"/>
@@ -4269,7 +4442,7 @@
                     <a:lstStyle/>
                     <a:p>
                       <a:r>
-                        <a:rPr lang="en-US" dirty="0" smtClean="0"/>
+                        <a:rPr lang="en-US" dirty="0"/>
                         <a:t>Wilma</a:t>
                       </a:r>
                       <a:endParaRPr lang="en-CA" dirty="0"/>
@@ -4283,7 +4456,7 @@
                     <a:lstStyle/>
                     <a:p>
                       <a:r>
-                        <a:rPr lang="en-US" dirty="0" smtClean="0"/>
+                        <a:rPr lang="en-US" dirty="0"/>
                         <a:t>Flintstone</a:t>
                       </a:r>
                       <a:endParaRPr lang="en-CA" dirty="0"/>
@@ -4297,14 +4470,18 @@
                     <a:lstStyle/>
                     <a:p>
                       <a:r>
-                        <a:rPr lang="en-CA" dirty="0" smtClean="0"/>
+                        <a:rPr lang="en-CA" dirty="0"/>
                         <a:t>1905-07-14 00:00:00.000</a:t>
                       </a:r>
-                      <a:endParaRPr lang="en-CA" dirty="0"/>
                     </a:p>
                   </a:txBody>
                   <a:tcPr/>
                 </a:tc>
+                <a:extLst>
+                  <a:ext uri="{0D108BD9-81ED-4DB2-BD59-A6C34878D82A}">
+                    <a16:rowId xmlns:a16="http://schemas.microsoft.com/office/drawing/2014/main" val="10002"/>
+                  </a:ext>
+                </a:extLst>
               </a:tr>
             </a:tbl>
           </a:graphicData>
@@ -4333,7 +4510,7 @@
           <a:lstStyle/>
           <a:p>
             <a:r>
-              <a:rPr lang="en-US" sz="2400" b="1" dirty="0" smtClean="0">
+              <a:rPr lang="en-US" sz="2400" b="1" dirty="0">
                 <a:solidFill>
                   <a:schemeClr val="tx2"/>
                 </a:solidFill>

</xml_diff>